<commit_message>
Implementation of Multilayer Perceptron from Scratch
</commit_message>
<xml_diff>
--- a/Dive into Deep Learning/7. Multilayer Perceptron-EN.pptx
+++ b/Dive into Deep Learning/7. Multilayer Perceptron-EN.pptx
@@ -9922,8 +9922,8 @@
           <a:lstStyle/>
           <a:p>
             <a:r>
-              <a:rPr lang="zh-CN" altLang="en-US" dirty="0"/>
-              <a:t>多层感知机在输出层与输入层之间加入了一个或多个全连接隐藏层，并通过激活函数对隐藏层输出进行变换。</a:t>
+              <a:rPr lang="en-US" dirty="0"/>
+              <a:t>The multilayer perceptron adds one or multiple fully-connected hidden layers between the output and input layers and transforms the output of the hidden layer via an activation function.</a:t>
             </a:r>
           </a:p>
         </p:txBody>

</xml_diff>